<commit_message>
Edge, CoAngle Create/Delete Effect Finish
</commit_message>
<xml_diff>
--- a/TriFunction/그림용.pptx
+++ b/TriFunction/그림용.pptx
@@ -7287,6 +7287,169 @@
           </a:p>
         </p:txBody>
       </p:sp>
+      <p:sp>
+        <p:nvSpPr>
+          <p:cNvPr id="28" name="원호 27"/>
+          <p:cNvSpPr/>
+          <p:nvPr/>
+        </p:nvSpPr>
+        <p:spPr>
+          <a:xfrm rot="10800000">
+            <a:off x="7702140" y="3892554"/>
+            <a:ext cx="748759" cy="748759"/>
+          </a:xfrm>
+          <a:prstGeom prst="arc">
+            <a:avLst>
+              <a:gd name="adj1" fmla="val 16391892"/>
+              <a:gd name="adj2" fmla="val 19578702"/>
+            </a:avLst>
+          </a:prstGeom>
+          <a:ln w="76200">
+            <a:solidFill>
+              <a:schemeClr val="accent1">
+                <a:lumMod val="20000"/>
+                <a:lumOff val="80000"/>
+              </a:schemeClr>
+            </a:solidFill>
+          </a:ln>
+        </p:spPr>
+        <p:style>
+          <a:lnRef idx="1">
+            <a:schemeClr val="accent1"/>
+          </a:lnRef>
+          <a:fillRef idx="0">
+            <a:schemeClr val="accent1"/>
+          </a:fillRef>
+          <a:effectRef idx="0">
+            <a:schemeClr val="accent1"/>
+          </a:effectRef>
+          <a:fontRef idx="minor">
+            <a:schemeClr val="tx1"/>
+          </a:fontRef>
+        </p:style>
+        <p:txBody>
+          <a:bodyPr rtlCol="0" anchor="ctr"/>
+          <a:lstStyle/>
+          <a:p>
+            <a:pPr algn="ctr"/>
+            <a:endParaRPr lang="ko-KR" altLang="en-US"/>
+          </a:p>
+        </p:txBody>
+      </p:sp>
+      <p:cxnSp>
+        <p:nvCxnSpPr>
+          <p:cNvPr id="31" name="직선 연결선 30"/>
+          <p:cNvCxnSpPr/>
+          <p:nvPr/>
+        </p:nvCxnSpPr>
+        <p:spPr>
+          <a:xfrm flipV="1">
+            <a:off x="3825336" y="1932742"/>
+            <a:ext cx="2193398" cy="1221235"/>
+          </a:xfrm>
+          <a:prstGeom prst="line">
+            <a:avLst/>
+          </a:prstGeom>
+          <a:ln w="76200">
+            <a:solidFill>
+              <a:schemeClr val="accent1">
+                <a:lumMod val="20000"/>
+                <a:lumOff val="80000"/>
+              </a:schemeClr>
+            </a:solidFill>
+          </a:ln>
+        </p:spPr>
+        <p:style>
+          <a:lnRef idx="1">
+            <a:schemeClr val="accent1"/>
+          </a:lnRef>
+          <a:fillRef idx="0">
+            <a:schemeClr val="accent1"/>
+          </a:fillRef>
+          <a:effectRef idx="0">
+            <a:schemeClr val="accent1"/>
+          </a:effectRef>
+          <a:fontRef idx="minor">
+            <a:schemeClr val="tx1"/>
+          </a:fontRef>
+        </p:style>
+      </p:cxnSp>
+      <p:cxnSp>
+        <p:nvCxnSpPr>
+          <p:cNvPr id="32" name="직선 연결선 31"/>
+          <p:cNvCxnSpPr/>
+          <p:nvPr/>
+        </p:nvCxnSpPr>
+        <p:spPr>
+          <a:xfrm flipV="1">
+            <a:off x="7869552" y="2701942"/>
+            <a:ext cx="0" cy="1221235"/>
+          </a:xfrm>
+          <a:prstGeom prst="line">
+            <a:avLst/>
+          </a:prstGeom>
+          <a:ln w="76200">
+            <a:solidFill>
+              <a:schemeClr val="accent1">
+                <a:lumMod val="20000"/>
+                <a:lumOff val="80000"/>
+              </a:schemeClr>
+            </a:solidFill>
+          </a:ln>
+        </p:spPr>
+        <p:style>
+          <a:lnRef idx="1">
+            <a:schemeClr val="accent1"/>
+          </a:lnRef>
+          <a:fillRef idx="0">
+            <a:schemeClr val="accent1"/>
+          </a:fillRef>
+          <a:effectRef idx="0">
+            <a:schemeClr val="accent1"/>
+          </a:effectRef>
+          <a:fontRef idx="minor">
+            <a:schemeClr val="tx1"/>
+          </a:fontRef>
+        </p:style>
+      </p:cxnSp>
+      <p:cxnSp>
+        <p:nvCxnSpPr>
+          <p:cNvPr id="33" name="직선 연결선 32"/>
+          <p:cNvCxnSpPr/>
+          <p:nvPr/>
+        </p:nvCxnSpPr>
+        <p:spPr>
+          <a:xfrm flipH="1">
+            <a:off x="4041173" y="5084017"/>
+            <a:ext cx="2193398" cy="0"/>
+          </a:xfrm>
+          <a:prstGeom prst="line">
+            <a:avLst/>
+          </a:prstGeom>
+          <a:ln w="76200">
+            <a:solidFill>
+              <a:schemeClr val="accent1">
+                <a:lumMod val="20000"/>
+                <a:lumOff val="80000"/>
+              </a:schemeClr>
+            </a:solidFill>
+          </a:ln>
+        </p:spPr>
+        <p:style>
+          <a:lnRef idx="1">
+            <a:schemeClr val="accent1"/>
+          </a:lnRef>
+          <a:fillRef idx="0">
+            <a:schemeClr val="accent1"/>
+          </a:fillRef>
+          <a:effectRef idx="0">
+            <a:schemeClr val="accent1"/>
+          </a:effectRef>
+          <a:fontRef idx="minor">
+            <a:schemeClr val="tx1"/>
+          </a:fontRef>
+        </p:style>
+      </p:cxnSp>
     </p:spTree>
     <p:extLst>
       <p:ext uri="{BB962C8B-B14F-4D97-AF65-F5344CB8AC3E}">

</xml_diff>

<commit_message>
무기들 공격 및 폭탄 충돌, Sound-GameInfo ON/OFF
</commit_message>
<xml_diff>
--- a/TriFunction/그림용.pptx
+++ b/TriFunction/그림용.pptx
@@ -215,7 +215,7 @@
           <a:p>
             <a:fld id="{7A69A65F-D152-468D-9567-D5957D3F5103}" type="datetimeFigureOut">
               <a:rPr lang="ko-KR" altLang="en-US" smtClean="0"/>
-              <a:t>2018-10-10</a:t>
+              <a:t>2018-10-11</a:t>
             </a:fld>
             <a:endParaRPr lang="ko-KR" altLang="en-US"/>
           </a:p>
@@ -614,7 +614,7 @@
           <a:p>
             <a:fld id="{39D6D5D5-D1C6-465B-B735-E2307C7708EA}" type="datetimeFigureOut">
               <a:rPr lang="ko-KR" altLang="en-US" smtClean="0"/>
-              <a:t>2018-10-10</a:t>
+              <a:t>2018-10-11</a:t>
             </a:fld>
             <a:endParaRPr lang="ko-KR" altLang="en-US"/>
           </a:p>
@@ -784,7 +784,7 @@
           <a:p>
             <a:fld id="{39D6D5D5-D1C6-465B-B735-E2307C7708EA}" type="datetimeFigureOut">
               <a:rPr lang="ko-KR" altLang="en-US" smtClean="0"/>
-              <a:t>2018-10-10</a:t>
+              <a:t>2018-10-11</a:t>
             </a:fld>
             <a:endParaRPr lang="ko-KR" altLang="en-US"/>
           </a:p>
@@ -964,7 +964,7 @@
           <a:p>
             <a:fld id="{39D6D5D5-D1C6-465B-B735-E2307C7708EA}" type="datetimeFigureOut">
               <a:rPr lang="ko-KR" altLang="en-US" smtClean="0"/>
-              <a:t>2018-10-10</a:t>
+              <a:t>2018-10-11</a:t>
             </a:fld>
             <a:endParaRPr lang="ko-KR" altLang="en-US"/>
           </a:p>
@@ -1134,7 +1134,7 @@
           <a:p>
             <a:fld id="{39D6D5D5-D1C6-465B-B735-E2307C7708EA}" type="datetimeFigureOut">
               <a:rPr lang="ko-KR" altLang="en-US" smtClean="0"/>
-              <a:t>2018-10-10</a:t>
+              <a:t>2018-10-11</a:t>
             </a:fld>
             <a:endParaRPr lang="ko-KR" altLang="en-US"/>
           </a:p>
@@ -1380,7 +1380,7 @@
           <a:p>
             <a:fld id="{39D6D5D5-D1C6-465B-B735-E2307C7708EA}" type="datetimeFigureOut">
               <a:rPr lang="ko-KR" altLang="en-US" smtClean="0"/>
-              <a:t>2018-10-10</a:t>
+              <a:t>2018-10-11</a:t>
             </a:fld>
             <a:endParaRPr lang="ko-KR" altLang="en-US"/>
           </a:p>
@@ -1612,7 +1612,7 @@
           <a:p>
             <a:fld id="{39D6D5D5-D1C6-465B-B735-E2307C7708EA}" type="datetimeFigureOut">
               <a:rPr lang="ko-KR" altLang="en-US" smtClean="0"/>
-              <a:t>2018-10-10</a:t>
+              <a:t>2018-10-11</a:t>
             </a:fld>
             <a:endParaRPr lang="ko-KR" altLang="en-US"/>
           </a:p>
@@ -1979,7 +1979,7 @@
           <a:p>
             <a:fld id="{39D6D5D5-D1C6-465B-B735-E2307C7708EA}" type="datetimeFigureOut">
               <a:rPr lang="ko-KR" altLang="en-US" smtClean="0"/>
-              <a:t>2018-10-10</a:t>
+              <a:t>2018-10-11</a:t>
             </a:fld>
             <a:endParaRPr lang="ko-KR" altLang="en-US"/>
           </a:p>
@@ -2097,7 +2097,7 @@
           <a:p>
             <a:fld id="{39D6D5D5-D1C6-465B-B735-E2307C7708EA}" type="datetimeFigureOut">
               <a:rPr lang="ko-KR" altLang="en-US" smtClean="0"/>
-              <a:t>2018-10-10</a:t>
+              <a:t>2018-10-11</a:t>
             </a:fld>
             <a:endParaRPr lang="ko-KR" altLang="en-US"/>
           </a:p>
@@ -2192,7 +2192,7 @@
           <a:p>
             <a:fld id="{39D6D5D5-D1C6-465B-B735-E2307C7708EA}" type="datetimeFigureOut">
               <a:rPr lang="ko-KR" altLang="en-US" smtClean="0"/>
-              <a:t>2018-10-10</a:t>
+              <a:t>2018-10-11</a:t>
             </a:fld>
             <a:endParaRPr lang="ko-KR" altLang="en-US"/>
           </a:p>
@@ -2469,7 +2469,7 @@
           <a:p>
             <a:fld id="{39D6D5D5-D1C6-465B-B735-E2307C7708EA}" type="datetimeFigureOut">
               <a:rPr lang="ko-KR" altLang="en-US" smtClean="0"/>
-              <a:t>2018-10-10</a:t>
+              <a:t>2018-10-11</a:t>
             </a:fld>
             <a:endParaRPr lang="ko-KR" altLang="en-US"/>
           </a:p>
@@ -2722,7 +2722,7 @@
           <a:p>
             <a:fld id="{39D6D5D5-D1C6-465B-B735-E2307C7708EA}" type="datetimeFigureOut">
               <a:rPr lang="ko-KR" altLang="en-US" smtClean="0"/>
-              <a:t>2018-10-10</a:t>
+              <a:t>2018-10-11</a:t>
             </a:fld>
             <a:endParaRPr lang="ko-KR" altLang="en-US"/>
           </a:p>
@@ -2935,7 +2935,7 @@
           <a:p>
             <a:fld id="{39D6D5D5-D1C6-465B-B735-E2307C7708EA}" type="datetimeFigureOut">
               <a:rPr lang="ko-KR" altLang="en-US" smtClean="0"/>
-              <a:t>2018-10-10</a:t>
+              <a:t>2018-10-11</a:t>
             </a:fld>
             <a:endParaRPr lang="ko-KR" altLang="en-US"/>
           </a:p>
@@ -4879,6 +4879,61 @@
           </p:spPr>
         </p:pic>
       </p:grpSp>
+      <p:sp>
+        <p:nvSpPr>
+          <p:cNvPr id="6" name="이등변 삼각형 5"/>
+          <p:cNvSpPr/>
+          <p:nvPr/>
+        </p:nvSpPr>
+        <p:spPr>
+          <a:xfrm>
+            <a:off x="4501364" y="3651381"/>
+            <a:ext cx="480602" cy="375887"/>
+          </a:xfrm>
+          <a:prstGeom prst="triangle">
+            <a:avLst/>
+          </a:prstGeom>
+          <a:gradFill>
+            <a:gsLst>
+              <a:gs pos="0">
+                <a:schemeClr val="accent4">
+                  <a:lumMod val="60000"/>
+                  <a:lumOff val="40000"/>
+                </a:schemeClr>
+              </a:gs>
+              <a:gs pos="50000">
+                <a:srgbClr val="FFAB2F"/>
+              </a:gs>
+              <a:gs pos="100000">
+                <a:srgbClr val="E6A400"/>
+              </a:gs>
+            </a:gsLst>
+          </a:gradFill>
+          <a:ln/>
+        </p:spPr>
+        <p:style>
+          <a:lnRef idx="0">
+            <a:schemeClr val="accent4"/>
+          </a:lnRef>
+          <a:fillRef idx="3">
+            <a:schemeClr val="accent4"/>
+          </a:fillRef>
+          <a:effectRef idx="3">
+            <a:schemeClr val="accent4"/>
+          </a:effectRef>
+          <a:fontRef idx="minor">
+            <a:schemeClr val="lt1"/>
+          </a:fontRef>
+        </p:style>
+        <p:txBody>
+          <a:bodyPr rtlCol="0" anchor="ctr"/>
+          <a:lstStyle/>
+          <a:p>
+            <a:pPr algn="ctr"/>
+            <a:endParaRPr lang="ko-KR" altLang="en-US"/>
+          </a:p>
+        </p:txBody>
+      </p:sp>
     </p:spTree>
     <p:extLst>
       <p:ext uri="{BB962C8B-B14F-4D97-AF65-F5344CB8AC3E}">

</xml_diff>